<commit_message>
add mn dev conf security headers talk
</commit_message>
<xml_diff>
--- a/2023-09-08-DSMDevOpsDays-DevOpsForDatabases/database-devops.pptx
+++ b/2023-09-08-DSMDevOpsDays-DevOpsForDatabases/database-devops.pptx
@@ -26446,8 +26446,8 @@
         </p:nvSpPr>
         <p:spPr>
           <a:xfrm>
-            <a:off x="0" y="365125"/>
-            <a:ext cx="12191999" cy="6027511"/>
+            <a:off x="0" y="1700668"/>
+            <a:ext cx="12191999" cy="4691968"/>
           </a:xfrm>
         </p:spPr>
         <p:txBody>
@@ -27032,6 +27032,36 @@
           </a:p>
         </p:txBody>
       </p:sp>
+      <p:pic>
+        <p:nvPicPr>
+          <p:cNvPr id="12" name="Picture 11">
+            <a:extLst>
+              <a:ext uri="{FF2B5EF4-FFF2-40B4-BE49-F238E27FC236}">
+                <a16:creationId xmlns:a16="http://schemas.microsoft.com/office/drawing/2014/main" id="{AC19C998-629E-568A-8672-75FB7C5E5EE4}"/>
+              </a:ext>
+            </a:extLst>
+          </p:cNvPr>
+          <p:cNvPicPr>
+            <a:picLocks noChangeAspect="1"/>
+          </p:cNvPicPr>
+          <p:nvPr/>
+        </p:nvPicPr>
+        <p:blipFill>
+          <a:blip r:embed="rId4"/>
+          <a:stretch>
+            <a:fillRect/>
+          </a:stretch>
+        </p:blipFill>
+        <p:spPr>
+          <a:xfrm>
+            <a:off x="4792833" y="465364"/>
+            <a:ext cx="2606331" cy="2606331"/>
+          </a:xfrm>
+          <a:prstGeom prst="rect">
+            <a:avLst/>
+          </a:prstGeom>
+        </p:spPr>
+      </p:pic>
     </p:spTree>
     <p:extLst>
       <p:ext uri="{BB962C8B-B14F-4D97-AF65-F5344CB8AC3E}">

</xml_diff>